<commit_message>
update ppt to use Kei's stg slide
</commit_message>
<xml_diff>
--- a/talks/stg/stg.pptx
+++ b/talks/stg/stg.pptx
@@ -198,7 +198,7 @@
           <a:p>
             <a:fld id="{12537525-5C75-0448-9C83-CBC8A496F3A6}" type="datetimeFigureOut">
               <a:rPr lang="en-US" smtClean="0"/>
-              <a:t>2/23/16</a:t>
+              <a:t>2/24/16</a:t>
             </a:fld>
             <a:endParaRPr lang="en-US"/>
           </a:p>
@@ -524,11 +524,7 @@
             </a:r>
             <a:r>
               <a:rPr lang="en-US" baseline="0" dirty="0" smtClean="0"/>
-              <a:t>/Apply for Higher-order Languages. Simon Marlow and Simon Peyton Jones</a:t>
-            </a:r>
-            <a:r>
-              <a:rPr lang="en-US" baseline="0" dirty="0" smtClean="0"/>
-              <a:t>.</a:t>
+              <a:t>/Apply for Higher-order Languages. Simon Marlow and Simon Peyton Jones.</a:t>
             </a:r>
           </a:p>
           <a:p>
@@ -536,10 +532,119 @@
           </a:p>
           <a:p>
             <a:r>
-              <a:rPr lang="en-US" baseline="0" dirty="0" smtClean="0"/>
+              <a:rPr lang="en-US" sz="1200" kern="1200" dirty="0" smtClean="0">
+                <a:solidFill>
+                  <a:schemeClr val="tx1"/>
+                </a:solidFill>
+                <a:latin typeface="+mn-lt"/>
+                <a:ea typeface="+mn-ea"/>
+                <a:cs typeface="+mn-cs"/>
+              </a:rPr>
+              <a:t>Constructors</a:t>
+            </a:r>
+          </a:p>
+          <a:p>
+            <a:endParaRPr lang="en-US" sz="1200" kern="1200" dirty="0" smtClean="0">
+              <a:solidFill>
+                <a:schemeClr val="tx1"/>
+              </a:solidFill>
+              <a:latin typeface="+mn-lt"/>
+              <a:ea typeface="+mn-ea"/>
+              <a:cs typeface="+mn-cs"/>
+            </a:endParaRPr>
+          </a:p>
+          <a:p>
+            <a:r>
+              <a:rPr lang="en-US" sz="1200" kern="1200" dirty="0" smtClean="0">
+                <a:solidFill>
+                  <a:schemeClr val="tx1"/>
+                </a:solidFill>
+                <a:latin typeface="+mn-lt"/>
+                <a:ea typeface="+mn-ea"/>
+                <a:cs typeface="+mn-cs"/>
+              </a:rPr>
+              <a:t>Unboxed/boxed  values</a:t>
+            </a:r>
+          </a:p>
+          <a:p>
+            <a:endParaRPr lang="en-US" sz="1200" kern="1200" dirty="0" smtClean="0">
+              <a:solidFill>
+                <a:schemeClr val="tx1"/>
+              </a:solidFill>
+              <a:latin typeface="+mn-lt"/>
+              <a:ea typeface="+mn-ea"/>
+              <a:cs typeface="+mn-cs"/>
+            </a:endParaRPr>
+          </a:p>
+          <a:p>
+            <a:r>
+              <a:rPr lang="en-US" sz="1200" kern="1200" dirty="0" smtClean="0">
+                <a:solidFill>
+                  <a:schemeClr val="tx1"/>
+                </a:solidFill>
+                <a:latin typeface="+mn-lt"/>
+                <a:ea typeface="+mn-ea"/>
+                <a:cs typeface="+mn-cs"/>
+              </a:rPr>
+              <a:t>function </a:t>
+            </a:r>
+            <a:r>
+              <a:rPr lang="en-US" sz="1200" kern="1200" dirty="0" smtClean="0">
+                <a:solidFill>
+                  <a:schemeClr val="tx1"/>
+                </a:solidFill>
+                <a:latin typeface="+mn-lt"/>
+                <a:ea typeface="+mn-ea"/>
+                <a:cs typeface="+mn-cs"/>
+              </a:rPr>
+              <a:t>calls (atoms</a:t>
+            </a:r>
+            <a:r>
+              <a:rPr lang="en-US" sz="1200" kern="1200" baseline="0" dirty="0" smtClean="0">
+                <a:solidFill>
+                  <a:schemeClr val="tx1"/>
+                </a:solidFill>
+                <a:latin typeface="+mn-lt"/>
+                <a:ea typeface="+mn-ea"/>
+                <a:cs typeface="+mn-cs"/>
+              </a:rPr>
               <a:t> </a:t>
             </a:r>
             <a:r>
+              <a:rPr lang="en-US" sz="1200" kern="1200" baseline="0" dirty="0" err="1" smtClean="0">
+                <a:solidFill>
+                  <a:schemeClr val="tx1"/>
+                </a:solidFill>
+                <a:latin typeface="+mn-lt"/>
+                <a:ea typeface="+mn-ea"/>
+                <a:cs typeface="+mn-cs"/>
+              </a:rPr>
+              <a:t>args</a:t>
+            </a:r>
+            <a:r>
+              <a:rPr lang="en-US" sz="1200" kern="1200" baseline="0" dirty="0" smtClean="0">
+                <a:solidFill>
+                  <a:schemeClr val="tx1"/>
+                </a:solidFill>
+                <a:latin typeface="+mn-lt"/>
+                <a:ea typeface="+mn-ea"/>
+                <a:cs typeface="+mn-cs"/>
+              </a:rPr>
+              <a:t> only)</a:t>
+            </a:r>
+          </a:p>
+          <a:p>
+            <a:endParaRPr lang="en-US" sz="1200" kern="1200" dirty="0" smtClean="0">
+              <a:solidFill>
+                <a:schemeClr val="tx1"/>
+              </a:solidFill>
+              <a:latin typeface="+mn-lt"/>
+              <a:ea typeface="+mn-ea"/>
+              <a:cs typeface="+mn-cs"/>
+            </a:endParaRPr>
+          </a:p>
+          <a:p>
+            <a:r>
               <a:rPr lang="en-US" sz="1200" kern="1200" dirty="0" smtClean="0">
                 <a:solidFill>
                   <a:schemeClr val="tx1"/>
@@ -548,8 +653,18 @@
                 <a:ea typeface="+mn-ea"/>
                 <a:cs typeface="+mn-cs"/>
               </a:rPr>
-              <a:t>Constructors</a:t>
-            </a:r>
+              <a:t>let</a:t>
+            </a:r>
+          </a:p>
+          <a:p>
+            <a:endParaRPr lang="en-US" sz="1200" kern="1200" dirty="0" smtClean="0">
+              <a:solidFill>
+                <a:schemeClr val="tx1"/>
+              </a:solidFill>
+              <a:latin typeface="+mn-lt"/>
+              <a:ea typeface="+mn-ea"/>
+              <a:cs typeface="+mn-cs"/>
+            </a:endParaRPr>
           </a:p>
           <a:p>
             <a:r>
@@ -561,8 +676,18 @@
                 <a:ea typeface="+mn-ea"/>
                 <a:cs typeface="+mn-cs"/>
               </a:rPr>
-              <a:t>Unboxed values</a:t>
-            </a:r>
+              <a:t>case</a:t>
+            </a:r>
+          </a:p>
+          <a:p>
+            <a:endParaRPr lang="en-US" sz="1200" kern="1200" dirty="0" smtClean="0">
+              <a:solidFill>
+                <a:schemeClr val="tx1"/>
+              </a:solidFill>
+              <a:latin typeface="+mn-lt"/>
+              <a:ea typeface="+mn-ea"/>
+              <a:cs typeface="+mn-cs"/>
+            </a:endParaRPr>
           </a:p>
           <a:p>
             <a:r>
@@ -574,33 +699,7 @@
                 <a:ea typeface="+mn-ea"/>
                 <a:cs typeface="+mn-cs"/>
               </a:rPr>
-              <a:t>function calls</a:t>
-            </a:r>
-          </a:p>
-          <a:p>
-            <a:r>
-              <a:rPr lang="en-US" sz="1200" kern="1200" dirty="0" smtClean="0">
-                <a:solidFill>
-                  <a:schemeClr val="tx1"/>
-                </a:solidFill>
-                <a:latin typeface="+mn-lt"/>
-                <a:ea typeface="+mn-ea"/>
-                <a:cs typeface="+mn-cs"/>
-              </a:rPr>
-              <a:t>let</a:t>
-            </a:r>
-          </a:p>
-          <a:p>
-            <a:r>
-              <a:rPr lang="en-US" sz="1200" kern="1200" dirty="0" smtClean="0">
-                <a:solidFill>
-                  <a:schemeClr val="tx1"/>
-                </a:solidFill>
-                <a:latin typeface="+mn-lt"/>
-                <a:ea typeface="+mn-ea"/>
-                <a:cs typeface="+mn-cs"/>
-              </a:rPr>
-              <a:t>case</a:t>
+              <a:t>Saturated constructors</a:t>
             </a:r>
           </a:p>
           <a:p>
@@ -2652,7 +2751,7 @@
           <a:p>
             <a:fld id="{576FA8E2-7DF6-9F4F-AB68-61CDEF8DF470}" type="datetimeFigureOut">
               <a:rPr lang="en-US" smtClean="0"/>
-              <a:t>2/23/16</a:t>
+              <a:t>2/24/16</a:t>
             </a:fld>
             <a:endParaRPr lang="en-US"/>
           </a:p>
@@ -2822,7 +2921,7 @@
           <a:p>
             <a:fld id="{576FA8E2-7DF6-9F4F-AB68-61CDEF8DF470}" type="datetimeFigureOut">
               <a:rPr lang="en-US" smtClean="0"/>
-              <a:t>2/23/16</a:t>
+              <a:t>2/24/16</a:t>
             </a:fld>
             <a:endParaRPr lang="en-US"/>
           </a:p>
@@ -3002,7 +3101,7 @@
           <a:p>
             <a:fld id="{576FA8E2-7DF6-9F4F-AB68-61CDEF8DF470}" type="datetimeFigureOut">
               <a:rPr lang="en-US" smtClean="0"/>
-              <a:t>2/23/16</a:t>
+              <a:t>2/24/16</a:t>
             </a:fld>
             <a:endParaRPr lang="en-US"/>
           </a:p>
@@ -3172,7 +3271,7 @@
           <a:p>
             <a:fld id="{576FA8E2-7DF6-9F4F-AB68-61CDEF8DF470}" type="datetimeFigureOut">
               <a:rPr lang="en-US" smtClean="0"/>
-              <a:t>2/23/16</a:t>
+              <a:t>2/24/16</a:t>
             </a:fld>
             <a:endParaRPr lang="en-US"/>
           </a:p>
@@ -3418,7 +3517,7 @@
           <a:p>
             <a:fld id="{576FA8E2-7DF6-9F4F-AB68-61CDEF8DF470}" type="datetimeFigureOut">
               <a:rPr lang="en-US" smtClean="0"/>
-              <a:t>2/23/16</a:t>
+              <a:t>2/24/16</a:t>
             </a:fld>
             <a:endParaRPr lang="en-US"/>
           </a:p>
@@ -3706,7 +3805,7 @@
           <a:p>
             <a:fld id="{576FA8E2-7DF6-9F4F-AB68-61CDEF8DF470}" type="datetimeFigureOut">
               <a:rPr lang="en-US" smtClean="0"/>
-              <a:t>2/23/16</a:t>
+              <a:t>2/24/16</a:t>
             </a:fld>
             <a:endParaRPr lang="en-US"/>
           </a:p>
@@ -4128,7 +4227,7 @@
           <a:p>
             <a:fld id="{576FA8E2-7DF6-9F4F-AB68-61CDEF8DF470}" type="datetimeFigureOut">
               <a:rPr lang="en-US" smtClean="0"/>
-              <a:t>2/23/16</a:t>
+              <a:t>2/24/16</a:t>
             </a:fld>
             <a:endParaRPr lang="en-US"/>
           </a:p>
@@ -4246,7 +4345,7 @@
           <a:p>
             <a:fld id="{576FA8E2-7DF6-9F4F-AB68-61CDEF8DF470}" type="datetimeFigureOut">
               <a:rPr lang="en-US" smtClean="0"/>
-              <a:t>2/23/16</a:t>
+              <a:t>2/24/16</a:t>
             </a:fld>
             <a:endParaRPr lang="en-US"/>
           </a:p>
@@ -4341,7 +4440,7 @@
           <a:p>
             <a:fld id="{576FA8E2-7DF6-9F4F-AB68-61CDEF8DF470}" type="datetimeFigureOut">
               <a:rPr lang="en-US" smtClean="0"/>
-              <a:t>2/23/16</a:t>
+              <a:t>2/24/16</a:t>
             </a:fld>
             <a:endParaRPr lang="en-US"/>
           </a:p>
@@ -4618,7 +4717,7 @@
           <a:p>
             <a:fld id="{576FA8E2-7DF6-9F4F-AB68-61CDEF8DF470}" type="datetimeFigureOut">
               <a:rPr lang="en-US" smtClean="0"/>
-              <a:t>2/23/16</a:t>
+              <a:t>2/24/16</a:t>
             </a:fld>
             <a:endParaRPr lang="en-US"/>
           </a:p>
@@ -4871,7 +4970,7 @@
           <a:p>
             <a:fld id="{576FA8E2-7DF6-9F4F-AB68-61CDEF8DF470}" type="datetimeFigureOut">
               <a:rPr lang="en-US" smtClean="0"/>
-              <a:t>2/23/16</a:t>
+              <a:t>2/24/16</a:t>
             </a:fld>
             <a:endParaRPr lang="en-US"/>
           </a:p>
@@ -5084,7 +5183,7 @@
           <a:p>
             <a:fld id="{576FA8E2-7DF6-9F4F-AB68-61CDEF8DF470}" type="datetimeFigureOut">
               <a:rPr lang="en-US" smtClean="0"/>
-              <a:t>2/23/16</a:t>
+              <a:t>2/24/16</a:t>
             </a:fld>
             <a:endParaRPr lang="en-US"/>
           </a:p>
@@ -5692,7 +5791,7 @@
       </p:sp>
       <p:pic>
         <p:nvPicPr>
-          <p:cNvPr id="6" name="Content Placeholder 5" descr="Screen Shot 2016-02-23 at 10.38.21 AM.png"/>
+          <p:cNvPr id="4" name="Content Placeholder 3" descr="stg.pdf"/>
           <p:cNvPicPr>
             <a:picLocks noGrp="1" noChangeAspect="1"/>
           </p:cNvPicPr>
@@ -5708,17 +5807,12 @@
               </a:ext>
             </a:extLst>
           </a:blip>
-          <a:srcRect t="-922" b="-922"/>
+          <a:srcRect t="13302" b="13302"/>
           <a:stretch>
             <a:fillRect/>
           </a:stretch>
         </p:blipFill>
-        <p:spPr>
-          <a:xfrm>
-            <a:off x="457200" y="1130300"/>
-            <a:ext cx="8229600" cy="5583238"/>
-          </a:xfrm>
-        </p:spPr>
+        <p:spPr/>
       </p:pic>
     </p:spTree>
     <p:extLst>

</xml_diff>